<commit_message>
Citing code source for PS6
</commit_message>
<xml_diff>
--- a/Documentation/Problem Set 6/Facade Design Pattern.pptx
+++ b/Documentation/Problem Set 6/Facade Design Pattern.pptx
@@ -747,7 +747,7 @@
           <a:p>
             <a:fld id="{89CA732C-EC8D-4D01-9C13-B333B2C03F22}" type="datetimeFigureOut">
               <a:rPr lang="en-US" smtClean="0"/>
-              <a:t>4/23/2018</a:t>
+              <a:t>4/24/2018</a:t>
             </a:fld>
             <a:endParaRPr lang="en-US"/>
           </a:p>
@@ -936,7 +936,7 @@
           <a:p>
             <a:fld id="{89CA732C-EC8D-4D01-9C13-B333B2C03F22}" type="datetimeFigureOut">
               <a:rPr lang="en-US" smtClean="0"/>
-              <a:t>4/23/2018</a:t>
+              <a:t>4/24/2018</a:t>
             </a:fld>
             <a:endParaRPr lang="en-US"/>
           </a:p>
@@ -1110,7 +1110,7 @@
           <a:p>
             <a:fld id="{89CA732C-EC8D-4D01-9C13-B333B2C03F22}" type="datetimeFigureOut">
               <a:rPr lang="en-US" smtClean="0"/>
-              <a:t>4/23/2018</a:t>
+              <a:t>4/24/2018</a:t>
             </a:fld>
             <a:endParaRPr lang="en-US"/>
           </a:p>
@@ -1252,7 +1252,7 @@
           <a:p>
             <a:fld id="{89CA732C-EC8D-4D01-9C13-B333B2C03F22}" type="datetimeFigureOut">
               <a:rPr lang="en-US" smtClean="0"/>
-              <a:t>4/23/2018</a:t>
+              <a:t>4/24/2018</a:t>
             </a:fld>
             <a:endParaRPr lang="en-US"/>
           </a:p>
@@ -1497,7 +1497,7 @@
           <a:p>
             <a:fld id="{89CA732C-EC8D-4D01-9C13-B333B2C03F22}" type="datetimeFigureOut">
               <a:rPr lang="en-US" smtClean="0"/>
-              <a:t>4/23/2018</a:t>
+              <a:t>4/24/2018</a:t>
             </a:fld>
             <a:endParaRPr lang="en-US"/>
           </a:p>
@@ -1896,7 +1896,7 @@
           <a:p>
             <a:fld id="{89CA732C-EC8D-4D01-9C13-B333B2C03F22}" type="datetimeFigureOut">
               <a:rPr lang="en-US" smtClean="0"/>
-              <a:t>4/23/2018</a:t>
+              <a:t>4/24/2018</a:t>
             </a:fld>
             <a:endParaRPr lang="en-US"/>
           </a:p>
@@ -2332,7 +2332,7 @@
           <a:p>
             <a:fld id="{89CA732C-EC8D-4D01-9C13-B333B2C03F22}" type="datetimeFigureOut">
               <a:rPr lang="en-US" smtClean="0"/>
-              <a:t>4/23/2018</a:t>
+              <a:t>4/24/2018</a:t>
             </a:fld>
             <a:endParaRPr lang="en-US"/>
           </a:p>
@@ -2427,7 +2427,7 @@
           <a:p>
             <a:fld id="{89CA732C-EC8D-4D01-9C13-B333B2C03F22}" type="datetimeFigureOut">
               <a:rPr lang="en-US" smtClean="0"/>
-              <a:t>4/23/2018</a:t>
+              <a:t>4/24/2018</a:t>
             </a:fld>
             <a:endParaRPr lang="en-US"/>
           </a:p>
@@ -2539,7 +2539,7 @@
           <a:p>
             <a:fld id="{89CA732C-EC8D-4D01-9C13-B333B2C03F22}" type="datetimeFigureOut">
               <a:rPr lang="en-US" smtClean="0"/>
-              <a:t>4/23/2018</a:t>
+              <a:t>4/24/2018</a:t>
             </a:fld>
             <a:endParaRPr lang="en-US"/>
           </a:p>
@@ -2806,7 +2806,7 @@
           <a:p>
             <a:fld id="{89CA732C-EC8D-4D01-9C13-B333B2C03F22}" type="datetimeFigureOut">
               <a:rPr lang="en-US" smtClean="0"/>
-              <a:t>4/23/2018</a:t>
+              <a:t>4/24/2018</a:t>
             </a:fld>
             <a:endParaRPr lang="en-US"/>
           </a:p>
@@ -3007,7 +3007,7 @@
           <a:p>
             <a:fld id="{89CA732C-EC8D-4D01-9C13-B333B2C03F22}" type="datetimeFigureOut">
               <a:rPr lang="en-US" smtClean="0"/>
-              <a:t>4/23/2018</a:t>
+              <a:t>4/24/2018</a:t>
             </a:fld>
             <a:endParaRPr lang="en-US"/>
           </a:p>
@@ -4093,7 +4093,7 @@
           <a:p>
             <a:fld id="{89CA732C-EC8D-4D01-9C13-B333B2C03F22}" type="datetimeFigureOut">
               <a:rPr lang="en-US" smtClean="0"/>
-              <a:t>4/23/2018</a:t>
+              <a:t>4/24/2018</a:t>
             </a:fld>
             <a:endParaRPr lang="en-US"/>
           </a:p>
@@ -5174,6 +5174,45 @@
           </a:prstGeom>
         </p:spPr>
       </p:pic>
+      <p:sp>
+        <p:nvSpPr>
+          <p:cNvPr id="2" name="TextBox 1">
+            <a:extLst>
+              <a:ext uri="{FF2B5EF4-FFF2-40B4-BE49-F238E27FC236}">
+                <a16:creationId xmlns:a16="http://schemas.microsoft.com/office/drawing/2014/main" id="{B3AFCF79-222D-4FF9-8E17-228B7C1E05CE}"/>
+              </a:ext>
+            </a:extLst>
+          </p:cNvPr>
+          <p:cNvSpPr txBox="1"/>
+          <p:nvPr/>
+        </p:nvSpPr>
+        <p:spPr>
+          <a:xfrm>
+            <a:off x="152400" y="6324600"/>
+            <a:ext cx="9171100" cy="369332"/>
+          </a:xfrm>
+          <a:prstGeom prst="rect">
+            <a:avLst/>
+          </a:prstGeom>
+          <a:noFill/>
+        </p:spPr>
+        <p:txBody>
+          <a:bodyPr wrap="none" rtlCol="0">
+            <a:spAutoFit/>
+          </a:bodyPr>
+          <a:lstStyle/>
+          <a:p>
+            <a:r>
+              <a:rPr lang="en-US" dirty="0">
+                <a:solidFill>
+                  <a:srgbClr val="C00000"/>
+                </a:solidFill>
+              </a:rPr>
+              <a:t>Code From: https://www.journaldev.com/1557/facade-design-pattern-in-java</a:t>
+            </a:r>
+          </a:p>
+        </p:txBody>
+      </p:sp>
     </p:spTree>
     <p:extLst>
       <p:ext uri="{BB962C8B-B14F-4D97-AF65-F5344CB8AC3E}">

</xml_diff>